<commit_message>
project plan v2 submitted
</commit_message>
<xml_diff>
--- a/5. Publications/project_plan_timetable.pptx
+++ b/5. Publications/project_plan_timetable.pptx
@@ -113,29 +113,84 @@
 </p:presentation>
 </file>
 
+<file path=ppt/revisionInfo.xml><?xml version="1.0" encoding="utf-8"?>
+<p1510:revInfo xmlns:a="http://schemas.openxmlformats.org/drawingml/2006/main" xmlns:r="http://schemas.openxmlformats.org/officeDocument/2006/relationships" xmlns:p1510="http://schemas.microsoft.com/office/powerpoint/2015/10/main">
+  <p1510:revLst>
+    <p1510:client id="{A06C7162-2FE0-4115-B37B-FF6F9512F9FA}" v="1" dt="2023-07-07T13:34:38.724"/>
+  </p1510:revLst>
+</p1510:revInfo>
+</file>
+
 <file path=ppt/changesInfos/changesInfo1.xml><?xml version="1.0" encoding="utf-8"?>
 <pc:chgInfo xmlns:a="http://schemas.openxmlformats.org/drawingml/2006/main" xmlns:r="http://schemas.openxmlformats.org/officeDocument/2006/relationships" xmlns:ac="http://schemas.microsoft.com/office/drawing/2013/main/command" xmlns:pc="http://schemas.microsoft.com/office/powerpoint/2013/main/command">
   <pc:docChgLst>
     <pc:chgData name="Ting-Chun Chen" userId="8b620db4-f4e9-4d09-ba74-5c2c631754b8" providerId="ADAL" clId="{A06C7162-2FE0-4115-B37B-FF6F9512F9FA}"/>
-    <pc:docChg chg="modSld">
-      <pc:chgData name="Ting-Chun Chen" userId="8b620db4-f4e9-4d09-ba74-5c2c631754b8" providerId="ADAL" clId="{A06C7162-2FE0-4115-B37B-FF6F9512F9FA}" dt="2023-07-04T16:11:27.571" v="10" actId="14100"/>
+    <pc:docChg chg="custSel modSld">
+      <pc:chgData name="Ting-Chun Chen" userId="8b620db4-f4e9-4d09-ba74-5c2c631754b8" providerId="ADAL" clId="{A06C7162-2FE0-4115-B37B-FF6F9512F9FA}" dt="2023-07-07T13:35:26.293" v="59" actId="1037"/>
       <pc:docMkLst>
         <pc:docMk/>
       </pc:docMkLst>
-      <pc:sldChg chg="addSp modSp mod">
-        <pc:chgData name="Ting-Chun Chen" userId="8b620db4-f4e9-4d09-ba74-5c2c631754b8" providerId="ADAL" clId="{A06C7162-2FE0-4115-B37B-FF6F9512F9FA}" dt="2023-07-04T16:11:27.571" v="10" actId="14100"/>
+      <pc:sldChg chg="mod">
+        <pc:chgData name="Ting-Chun Chen" userId="8b620db4-f4e9-4d09-ba74-5c2c631754b8" providerId="ADAL" clId="{A06C7162-2FE0-4115-B37B-FF6F9512F9FA}" dt="2023-07-07T13:33:20.414" v="16" actId="27918"/>
+        <pc:sldMkLst>
+          <pc:docMk/>
+          <pc:sldMk cId="2230354145" sldId="256"/>
+        </pc:sldMkLst>
+      </pc:sldChg>
+      <pc:sldChg chg="addSp delSp modSp mod">
+        <pc:chgData name="Ting-Chun Chen" userId="8b620db4-f4e9-4d09-ba74-5c2c631754b8" providerId="ADAL" clId="{A06C7162-2FE0-4115-B37B-FF6F9512F9FA}" dt="2023-07-07T13:35:26.293" v="59" actId="1037"/>
         <pc:sldMkLst>
           <pc:docMk/>
           <pc:sldMk cId="1971087184" sldId="257"/>
         </pc:sldMkLst>
         <pc:spChg chg="add mod ord">
-          <ac:chgData name="Ting-Chun Chen" userId="8b620db4-f4e9-4d09-ba74-5c2c631754b8" providerId="ADAL" clId="{A06C7162-2FE0-4115-B37B-FF6F9512F9FA}" dt="2023-07-04T16:11:27.571" v="10" actId="14100"/>
+          <ac:chgData name="Ting-Chun Chen" userId="8b620db4-f4e9-4d09-ba74-5c2c631754b8" providerId="ADAL" clId="{A06C7162-2FE0-4115-B37B-FF6F9512F9FA}" dt="2023-07-07T13:34:54.387" v="27" actId="1076"/>
           <ac:spMkLst>
             <pc:docMk/>
             <pc:sldMk cId="1971087184" sldId="257"/>
             <ac:spMk id="2" creationId="{C9172281-512F-0F04-0D72-40E55A0A3336}"/>
           </ac:spMkLst>
         </pc:spChg>
+        <pc:spChg chg="mod">
+          <ac:chgData name="Ting-Chun Chen" userId="8b620db4-f4e9-4d09-ba74-5c2c631754b8" providerId="ADAL" clId="{A06C7162-2FE0-4115-B37B-FF6F9512F9FA}" dt="2023-07-07T13:35:12.428" v="39" actId="1035"/>
+          <ac:spMkLst>
+            <pc:docMk/>
+            <pc:sldMk cId="1971087184" sldId="257"/>
+            <ac:spMk id="5" creationId="{A7212168-5081-FE28-EF9F-54E93FEC4087}"/>
+          </ac:spMkLst>
+        </pc:spChg>
+        <pc:spChg chg="mod">
+          <ac:chgData name="Ting-Chun Chen" userId="8b620db4-f4e9-4d09-ba74-5c2c631754b8" providerId="ADAL" clId="{A06C7162-2FE0-4115-B37B-FF6F9512F9FA}" dt="2023-07-07T13:35:05.301" v="34" actId="1037"/>
+          <ac:spMkLst>
+            <pc:docMk/>
+            <pc:sldMk cId="1971087184" sldId="257"/>
+            <ac:spMk id="13" creationId="{B78917B4-DE88-CB60-A7AB-A5BB9B034341}"/>
+          </ac:spMkLst>
+        </pc:spChg>
+        <pc:spChg chg="mod">
+          <ac:chgData name="Ting-Chun Chen" userId="8b620db4-f4e9-4d09-ba74-5c2c631754b8" providerId="ADAL" clId="{A06C7162-2FE0-4115-B37B-FF6F9512F9FA}" dt="2023-07-07T13:35:26.293" v="59" actId="1037"/>
+          <ac:spMkLst>
+            <pc:docMk/>
+            <pc:sldMk cId="1971087184" sldId="257"/>
+            <ac:spMk id="14" creationId="{53B1F732-F409-17A5-4B97-CCEA638EDAB6}"/>
+          </ac:spMkLst>
+        </pc:spChg>
+        <pc:picChg chg="add mod ord">
+          <ac:chgData name="Ting-Chun Chen" userId="8b620db4-f4e9-4d09-ba74-5c2c631754b8" providerId="ADAL" clId="{A06C7162-2FE0-4115-B37B-FF6F9512F9FA}" dt="2023-07-07T13:34:49.620" v="26" actId="1036"/>
+          <ac:picMkLst>
+            <pc:docMk/>
+            <pc:sldMk cId="1971087184" sldId="257"/>
+            <ac:picMk id="9" creationId="{807C54B4-F978-A401-7EFB-25FFAF314559}"/>
+          </ac:picMkLst>
+        </pc:picChg>
+        <pc:picChg chg="del">
+          <ac:chgData name="Ting-Chun Chen" userId="8b620db4-f4e9-4d09-ba74-5c2c631754b8" providerId="ADAL" clId="{A06C7162-2FE0-4115-B37B-FF6F9512F9FA}" dt="2023-07-07T13:34:34.945" v="17" actId="478"/>
+          <ac:picMkLst>
+            <pc:docMk/>
+            <pc:sldMk cId="1971087184" sldId="257"/>
+            <ac:picMk id="20" creationId="{7279B182-4C8B-0DAD-8ACA-4B5A2017FD30}"/>
+          </ac:picMkLst>
+        </pc:picChg>
       </pc:sldChg>
     </pc:docChg>
   </pc:docChgLst>
@@ -296,7 +351,7 @@
                   <c:v>45152</c:v>
                 </c:pt>
                 <c:pt idx="2">
-                  <c:v>45138</c:v>
+                  <c:v>45131</c:v>
                 </c:pt>
                 <c:pt idx="3">
                   <c:v>45124</c:v>
@@ -388,10 +443,10 @@
                   <c:v>7</c:v>
                 </c:pt>
                 <c:pt idx="2">
-                  <c:v>14</c:v>
+                  <c:v>21</c:v>
                 </c:pt>
                 <c:pt idx="3">
-                  <c:v>14</c:v>
+                  <c:v>7</c:v>
                 </c:pt>
                 <c:pt idx="4">
                   <c:v>7</c:v>
@@ -536,7 +591,7 @@
                         <c:v>45149</c:v>
                       </c:pt>
                       <c:pt idx="3">
-                        <c:v>45135</c:v>
+                        <c:v>45128</c:v>
                       </c:pt>
                       <c:pt idx="4">
                         <c:v>45121</c:v>
@@ -1394,7 +1449,7 @@
           <a:p>
             <a:fld id="{B9DAAFB5-49CF-4561-AFE9-288ECD25F3B9}" type="datetimeFigureOut">
               <a:rPr lang="en-GB" smtClean="0"/>
-              <a:t>04/07/2023</a:t>
+              <a:t>07/07/2023</a:t>
             </a:fld>
             <a:endParaRPr lang="en-GB"/>
           </a:p>
@@ -1594,7 +1649,7 @@
           <a:p>
             <a:fld id="{B9DAAFB5-49CF-4561-AFE9-288ECD25F3B9}" type="datetimeFigureOut">
               <a:rPr lang="en-GB" smtClean="0"/>
-              <a:t>04/07/2023</a:t>
+              <a:t>07/07/2023</a:t>
             </a:fld>
             <a:endParaRPr lang="en-GB"/>
           </a:p>
@@ -1804,7 +1859,7 @@
           <a:p>
             <a:fld id="{B9DAAFB5-49CF-4561-AFE9-288ECD25F3B9}" type="datetimeFigureOut">
               <a:rPr lang="en-GB" smtClean="0"/>
-              <a:t>04/07/2023</a:t>
+              <a:t>07/07/2023</a:t>
             </a:fld>
             <a:endParaRPr lang="en-GB"/>
           </a:p>
@@ -2004,7 +2059,7 @@
           <a:p>
             <a:fld id="{B9DAAFB5-49CF-4561-AFE9-288ECD25F3B9}" type="datetimeFigureOut">
               <a:rPr lang="en-GB" smtClean="0"/>
-              <a:t>04/07/2023</a:t>
+              <a:t>07/07/2023</a:t>
             </a:fld>
             <a:endParaRPr lang="en-GB"/>
           </a:p>
@@ -2280,7 +2335,7 @@
           <a:p>
             <a:fld id="{B9DAAFB5-49CF-4561-AFE9-288ECD25F3B9}" type="datetimeFigureOut">
               <a:rPr lang="en-GB" smtClean="0"/>
-              <a:t>04/07/2023</a:t>
+              <a:t>07/07/2023</a:t>
             </a:fld>
             <a:endParaRPr lang="en-GB"/>
           </a:p>
@@ -2548,7 +2603,7 @@
           <a:p>
             <a:fld id="{B9DAAFB5-49CF-4561-AFE9-288ECD25F3B9}" type="datetimeFigureOut">
               <a:rPr lang="en-GB" smtClean="0"/>
-              <a:t>04/07/2023</a:t>
+              <a:t>07/07/2023</a:t>
             </a:fld>
             <a:endParaRPr lang="en-GB"/>
           </a:p>
@@ -2963,7 +3018,7 @@
           <a:p>
             <a:fld id="{B9DAAFB5-49CF-4561-AFE9-288ECD25F3B9}" type="datetimeFigureOut">
               <a:rPr lang="en-GB" smtClean="0"/>
-              <a:t>04/07/2023</a:t>
+              <a:t>07/07/2023</a:t>
             </a:fld>
             <a:endParaRPr lang="en-GB"/>
           </a:p>
@@ -3105,7 +3160,7 @@
           <a:p>
             <a:fld id="{B9DAAFB5-49CF-4561-AFE9-288ECD25F3B9}" type="datetimeFigureOut">
               <a:rPr lang="en-GB" smtClean="0"/>
-              <a:t>04/07/2023</a:t>
+              <a:t>07/07/2023</a:t>
             </a:fld>
             <a:endParaRPr lang="en-GB"/>
           </a:p>
@@ -3218,7 +3273,7 @@
           <a:p>
             <a:fld id="{B9DAAFB5-49CF-4561-AFE9-288ECD25F3B9}" type="datetimeFigureOut">
               <a:rPr lang="en-GB" smtClean="0"/>
-              <a:t>04/07/2023</a:t>
+              <a:t>07/07/2023</a:t>
             </a:fld>
             <a:endParaRPr lang="en-GB"/>
           </a:p>
@@ -3531,7 +3586,7 @@
           <a:p>
             <a:fld id="{B9DAAFB5-49CF-4561-AFE9-288ECD25F3B9}" type="datetimeFigureOut">
               <a:rPr lang="en-GB" smtClean="0"/>
-              <a:t>04/07/2023</a:t>
+              <a:t>07/07/2023</a:t>
             </a:fld>
             <a:endParaRPr lang="en-GB"/>
           </a:p>
@@ -3820,7 +3875,7 @@
           <a:p>
             <a:fld id="{B9DAAFB5-49CF-4561-AFE9-288ECD25F3B9}" type="datetimeFigureOut">
               <a:rPr lang="en-GB" smtClean="0"/>
-              <a:t>04/07/2023</a:t>
+              <a:t>07/07/2023</a:t>
             </a:fld>
             <a:endParaRPr lang="en-GB"/>
           </a:p>
@@ -4063,7 +4118,7 @@
           <a:p>
             <a:fld id="{B9DAAFB5-49CF-4561-AFE9-288ECD25F3B9}" type="datetimeFigureOut">
               <a:rPr lang="en-GB" smtClean="0"/>
-              <a:t>04/07/2023</a:t>
+              <a:t>07/07/2023</a:t>
             </a:fld>
             <a:endParaRPr lang="en-GB"/>
           </a:p>
@@ -4493,7 +4548,7 @@
           <p:nvPr>
             <p:extLst>
               <p:ext uri="{D42A27DB-BD31-4B8C-83A1-F6EECF244321}">
-                <p14:modId xmlns:p14="http://schemas.microsoft.com/office/powerpoint/2010/main" val="269589807"/>
+                <p14:modId xmlns:p14="http://schemas.microsoft.com/office/powerpoint/2010/main" val="3401897073"/>
               </p:ext>
             </p:extLst>
           </p:nvPr>
@@ -4552,7 +4607,7 @@
         </p:nvSpPr>
         <p:spPr>
           <a:xfrm>
-            <a:off x="90392" y="659648"/>
+            <a:off x="90392" y="657584"/>
             <a:ext cx="13969163" cy="5645384"/>
           </a:xfrm>
           <a:prstGeom prst="rect">
@@ -4592,10 +4647,10 @@
       </p:sp>
       <p:pic>
         <p:nvPicPr>
-          <p:cNvPr id="20" name="Picture 19">
-            <a:extLst>
-              <a:ext uri="{FF2B5EF4-FFF2-40B4-BE49-F238E27FC236}">
-                <a16:creationId xmlns:a16="http://schemas.microsoft.com/office/drawing/2014/main" id="{7279B182-4C8B-0DAD-8ACA-4B5A2017FD30}"/>
+          <p:cNvPr id="9" name="Picture 8">
+            <a:extLst>
+              <a:ext uri="{FF2B5EF4-FFF2-40B4-BE49-F238E27FC236}">
+                <a16:creationId xmlns:a16="http://schemas.microsoft.com/office/drawing/2014/main" id="{807C54B4-F978-A401-7EFB-25FFAF314559}"/>
               </a:ext>
             </a:extLst>
           </p:cNvPr>
@@ -4612,7 +4667,7 @@
         </p:blipFill>
         <p:spPr>
           <a:xfrm>
-            <a:off x="45195" y="659647"/>
+            <a:off x="45195" y="657583"/>
             <a:ext cx="12101609" cy="5645385"/>
           </a:xfrm>
           <a:prstGeom prst="rect">
@@ -4743,7 +4798,7 @@
         </p:nvSpPr>
         <p:spPr>
           <a:xfrm>
-            <a:off x="8681329" y="3033786"/>
+            <a:off x="7963482" y="3008148"/>
             <a:ext cx="1217766" cy="338554"/>
           </a:xfrm>
           <a:prstGeom prst="rect">
@@ -5043,7 +5098,7 @@
         </p:nvSpPr>
         <p:spPr>
           <a:xfrm>
-            <a:off x="7471410" y="3042869"/>
+            <a:off x="7112893" y="3042869"/>
             <a:ext cx="956310" cy="307777"/>
           </a:xfrm>
           <a:prstGeom prst="rect">
@@ -5064,7 +5119,7 @@
                   <a:schemeClr val="bg1"/>
                 </a:solidFill>
               </a:rPr>
-              <a:t>Week 3, 4</a:t>
+              <a:t>Week 3</a:t>
             </a:r>
           </a:p>
         </p:txBody>
@@ -5083,7 +5138,7 @@
         </p:nvSpPr>
         <p:spPr>
           <a:xfrm>
-            <a:off x="8877812" y="3796848"/>
+            <a:off x="8537931" y="3796848"/>
             <a:ext cx="952500" cy="307777"/>
           </a:xfrm>
           <a:prstGeom prst="rect">
@@ -5104,7 +5159,7 @@
                   <a:schemeClr val="bg1"/>
                 </a:solidFill>
               </a:rPr>
-              <a:t>Week 5, 6</a:t>
+              <a:t>Week 4-6</a:t>
             </a:r>
           </a:p>
         </p:txBody>

</xml_diff>